<commit_message>
Very Important ER Diagram Update
</commit_message>
<xml_diff>
--- a/ER Diagram - Project - COMP3005.pptx
+++ b/ER Diagram - Project - COMP3005.pptx
@@ -223,7 +223,7 @@
           <a:p>
             <a:fld id="{4EEA96E3-5376-2D42-97CA-66A886050071}" type="datetimeFigureOut">
               <a:rPr lang="en-US" smtClean="0"/>
-              <a:t>3/3/20</a:t>
+              <a:t>3/4/2020</a:t>
             </a:fld>
             <a:endParaRPr lang="en-US"/>
           </a:p>
@@ -465,7 +465,7 @@
           <a:p>
             <a:fld id="{3BD378E5-F4D9-824D-8BC6-66DDB52D5CFC}" type="datetimeFigureOut">
               <a:rPr lang="en-US" smtClean="0"/>
-              <a:t>3/3/20</a:t>
+              <a:t>3/4/2020</a:t>
             </a:fld>
             <a:endParaRPr lang="en-US"/>
           </a:p>
@@ -663,7 +663,7 @@
           <a:p>
             <a:fld id="{3BD378E5-F4D9-824D-8BC6-66DDB52D5CFC}" type="datetimeFigureOut">
               <a:rPr lang="en-US" smtClean="0"/>
-              <a:t>3/3/20</a:t>
+              <a:t>3/4/2020</a:t>
             </a:fld>
             <a:endParaRPr lang="en-US"/>
           </a:p>
@@ -871,7 +871,7 @@
           <a:p>
             <a:fld id="{3BD378E5-F4D9-824D-8BC6-66DDB52D5CFC}" type="datetimeFigureOut">
               <a:rPr lang="en-US" smtClean="0"/>
-              <a:t>3/3/20</a:t>
+              <a:t>3/4/2020</a:t>
             </a:fld>
             <a:endParaRPr lang="en-US"/>
           </a:p>
@@ -1069,7 +1069,7 @@
           <a:p>
             <a:fld id="{3BD378E5-F4D9-824D-8BC6-66DDB52D5CFC}" type="datetimeFigureOut">
               <a:rPr lang="en-US" smtClean="0"/>
-              <a:t>3/3/20</a:t>
+              <a:t>3/4/2020</a:t>
             </a:fld>
             <a:endParaRPr lang="en-US"/>
           </a:p>
@@ -1344,7 +1344,7 @@
           <a:p>
             <a:fld id="{3BD378E5-F4D9-824D-8BC6-66DDB52D5CFC}" type="datetimeFigureOut">
               <a:rPr lang="en-US" smtClean="0"/>
-              <a:t>3/3/20</a:t>
+              <a:t>3/4/2020</a:t>
             </a:fld>
             <a:endParaRPr lang="en-US"/>
           </a:p>
@@ -1609,7 +1609,7 @@
           <a:p>
             <a:fld id="{3BD378E5-F4D9-824D-8BC6-66DDB52D5CFC}" type="datetimeFigureOut">
               <a:rPr lang="en-US" smtClean="0"/>
-              <a:t>3/3/20</a:t>
+              <a:t>3/4/2020</a:t>
             </a:fld>
             <a:endParaRPr lang="en-US"/>
           </a:p>
@@ -2021,7 +2021,7 @@
           <a:p>
             <a:fld id="{3BD378E5-F4D9-824D-8BC6-66DDB52D5CFC}" type="datetimeFigureOut">
               <a:rPr lang="en-US" smtClean="0"/>
-              <a:t>3/3/20</a:t>
+              <a:t>3/4/2020</a:t>
             </a:fld>
             <a:endParaRPr lang="en-US"/>
           </a:p>
@@ -2162,7 +2162,7 @@
           <a:p>
             <a:fld id="{3BD378E5-F4D9-824D-8BC6-66DDB52D5CFC}" type="datetimeFigureOut">
               <a:rPr lang="en-US" smtClean="0"/>
-              <a:t>3/3/20</a:t>
+              <a:t>3/4/2020</a:t>
             </a:fld>
             <a:endParaRPr lang="en-US"/>
           </a:p>
@@ -2275,7 +2275,7 @@
           <a:p>
             <a:fld id="{3BD378E5-F4D9-824D-8BC6-66DDB52D5CFC}" type="datetimeFigureOut">
               <a:rPr lang="en-US" smtClean="0"/>
-              <a:t>3/3/20</a:t>
+              <a:t>3/4/2020</a:t>
             </a:fld>
             <a:endParaRPr lang="en-US"/>
           </a:p>
@@ -2586,7 +2586,7 @@
           <a:p>
             <a:fld id="{3BD378E5-F4D9-824D-8BC6-66DDB52D5CFC}" type="datetimeFigureOut">
               <a:rPr lang="en-US" smtClean="0"/>
-              <a:t>3/3/20</a:t>
+              <a:t>3/4/2020</a:t>
             </a:fld>
             <a:endParaRPr lang="en-US"/>
           </a:p>
@@ -2874,7 +2874,7 @@
           <a:p>
             <a:fld id="{3BD378E5-F4D9-824D-8BC6-66DDB52D5CFC}" type="datetimeFigureOut">
               <a:rPr lang="en-US" smtClean="0"/>
-              <a:t>3/3/20</a:t>
+              <a:t>3/4/2020</a:t>
             </a:fld>
             <a:endParaRPr lang="en-US"/>
           </a:p>
@@ -3115,7 +3115,7 @@
           <a:p>
             <a:fld id="{3BD378E5-F4D9-824D-8BC6-66DDB52D5CFC}" type="datetimeFigureOut">
               <a:rPr lang="en-US" smtClean="0"/>
-              <a:t>3/3/20</a:t>
+              <a:t>3/4/2020</a:t>
             </a:fld>
             <a:endParaRPr lang="en-US"/>
           </a:p>
@@ -6026,54 +6026,6 @@
           </a:graphicData>
         </a:graphic>
       </p:graphicFrame>
-      <p:cxnSp>
-        <p:nvCxnSpPr>
-          <p:cNvPr id="133" name="Straight Arrow Connector 132">
-            <a:extLst>
-              <a:ext uri="{FF2B5EF4-FFF2-40B4-BE49-F238E27FC236}">
-                <a16:creationId xmlns:a16="http://schemas.microsoft.com/office/drawing/2014/main" id="{C45E9ECF-9656-B742-BDF2-A6E0D51788E5}"/>
-              </a:ext>
-            </a:extLst>
-          </p:cNvPr>
-          <p:cNvCxnSpPr>
-            <a:cxnSpLocks/>
-            <a:stCxn id="129" idx="1"/>
-            <a:endCxn id="4" idx="2"/>
-          </p:cNvCxnSpPr>
-          <p:nvPr/>
-        </p:nvCxnSpPr>
-        <p:spPr>
-          <a:xfrm flipH="1" flipV="1">
-            <a:off x="5014181" y="1199403"/>
-            <a:ext cx="362106" cy="877663"/>
-          </a:xfrm>
-          <a:prstGeom prst="straightConnector1">
-            <a:avLst/>
-          </a:prstGeom>
-          <a:ln cap="flat" cmpd="sng">
-            <a:solidFill>
-              <a:schemeClr val="accent1"/>
-            </a:solidFill>
-            <a:prstDash val="solid"/>
-            <a:miter lim="800000"/>
-            <a:tailEnd type="triangle" w="lg" len="med"/>
-          </a:ln>
-        </p:spPr>
-        <p:style>
-          <a:lnRef idx="1">
-            <a:schemeClr val="accent1"/>
-          </a:lnRef>
-          <a:fillRef idx="0">
-            <a:schemeClr val="accent1"/>
-          </a:fillRef>
-          <a:effectRef idx="0">
-            <a:schemeClr val="accent1"/>
-          </a:effectRef>
-          <a:fontRef idx="minor">
-            <a:schemeClr val="tx1"/>
-          </a:fontRef>
-        </p:style>
-      </p:cxnSp>
       <p:graphicFrame>
         <p:nvGraphicFramePr>
           <p:cNvPr id="139" name="Table 138">
@@ -6263,110 +6215,6 @@
           </a:graphicData>
         </a:graphic>
       </p:graphicFrame>
-      <p:cxnSp>
-        <p:nvCxnSpPr>
-          <p:cNvPr id="142" name="Straight Arrow Connector 141">
-            <a:extLst>
-              <a:ext uri="{FF2B5EF4-FFF2-40B4-BE49-F238E27FC236}">
-                <a16:creationId xmlns:a16="http://schemas.microsoft.com/office/drawing/2014/main" id="{5D48E8A7-2227-E64A-B1B9-A47EA8A6EE74}"/>
-              </a:ext>
-            </a:extLst>
-          </p:cNvPr>
-          <p:cNvCxnSpPr>
-            <a:cxnSpLocks/>
-            <a:stCxn id="139" idx="3"/>
-            <a:endCxn id="4" idx="2"/>
-          </p:cNvCxnSpPr>
-          <p:nvPr/>
-        </p:nvCxnSpPr>
-        <p:spPr>
-          <a:xfrm flipV="1">
-            <a:off x="4547396" y="1199403"/>
-            <a:ext cx="466785" cy="879756"/>
-          </a:xfrm>
-          <a:prstGeom prst="straightConnector1">
-            <a:avLst/>
-          </a:prstGeom>
-          <a:ln cap="flat" cmpd="sng">
-            <a:solidFill>
-              <a:schemeClr val="accent1"/>
-            </a:solidFill>
-            <a:prstDash val="solid"/>
-            <a:miter lim="800000"/>
-            <a:tailEnd type="triangle" w="lg" len="med"/>
-          </a:ln>
-        </p:spPr>
-        <p:style>
-          <a:lnRef idx="1">
-            <a:schemeClr val="accent1"/>
-          </a:lnRef>
-          <a:fillRef idx="0">
-            <a:schemeClr val="accent1"/>
-          </a:fillRef>
-          <a:effectRef idx="0">
-            <a:schemeClr val="accent1"/>
-          </a:effectRef>
-          <a:fontRef idx="minor">
-            <a:schemeClr val="tx1"/>
-          </a:fontRef>
-        </p:style>
-      </p:cxnSp>
-      <p:sp>
-        <p:nvSpPr>
-          <p:cNvPr id="154" name="TextBox 153">
-            <a:extLst>
-              <a:ext uri="{FF2B5EF4-FFF2-40B4-BE49-F238E27FC236}">
-                <a16:creationId xmlns:a16="http://schemas.microsoft.com/office/drawing/2014/main" id="{49F9C899-F7BB-9047-8DD9-1D05426CE878}"/>
-              </a:ext>
-            </a:extLst>
-          </p:cNvPr>
-          <p:cNvSpPr txBox="1"/>
-          <p:nvPr/>
-        </p:nvSpPr>
-        <p:spPr>
-          <a:xfrm rot="5400000">
-            <a:off x="4428136" y="1701857"/>
-            <a:ext cx="1172089" cy="461665"/>
-          </a:xfrm>
-          <a:prstGeom prst="rect">
-            <a:avLst/>
-          </a:prstGeom>
-          <a:noFill/>
-        </p:spPr>
-        <p:txBody>
-          <a:bodyPr wrap="square" rtlCol="0">
-            <a:spAutoFit/>
-          </a:bodyPr>
-          <a:lstStyle/>
-          <a:p>
-            <a:pPr algn="ctr"/>
-            <a:r>
-              <a:rPr lang="en-US" sz="800" dirty="0">
-                <a:latin typeface="Times" pitchFamily="2" charset="0"/>
-              </a:rPr>
-              <a:t>overlapping</a:t>
-            </a:r>
-          </a:p>
-          <a:p>
-            <a:pPr algn="ctr"/>
-            <a:r>
-              <a:rPr lang="en-US" sz="800" dirty="0">
-                <a:latin typeface="Times" pitchFamily="2" charset="0"/>
-              </a:rPr>
-              <a:t>idk how to make </a:t>
-            </a:r>
-          </a:p>
-          <a:p>
-            <a:pPr algn="ctr"/>
-            <a:r>
-              <a:rPr lang="en-US" sz="800" dirty="0">
-                <a:latin typeface="Times" pitchFamily="2" charset="0"/>
-              </a:rPr>
-              <a:t>open arrow heads...</a:t>
-            </a:r>
-          </a:p>
-        </p:txBody>
-      </p:sp>
       <p:sp>
         <p:nvSpPr>
           <p:cNvPr id="156" name="Diamond 155">
@@ -6457,6 +6305,11 @@
           <a:prstGeom prst="line">
             <a:avLst/>
           </a:prstGeom>
+          <a:ln>
+            <a:solidFill>
+              <a:schemeClr val="accent1"/>
+            </a:solidFill>
+          </a:ln>
         </p:spPr>
         <p:style>
           <a:lnRef idx="1">
@@ -6513,6 +6366,240 @@
           </a:fontRef>
         </p:style>
       </p:cxnSp>
+      <p:grpSp>
+        <p:nvGrpSpPr>
+          <p:cNvPr id="22" name="Group 21">
+            <a:extLst>
+              <a:ext uri="{FF2B5EF4-FFF2-40B4-BE49-F238E27FC236}">
+                <a16:creationId xmlns:a16="http://schemas.microsoft.com/office/drawing/2014/main" id="{AA0EB1B5-CA51-4041-BC0F-C09C1A901108}"/>
+              </a:ext>
+            </a:extLst>
+          </p:cNvPr>
+          <p:cNvGrpSpPr/>
+          <p:nvPr/>
+        </p:nvGrpSpPr>
+        <p:grpSpPr>
+          <a:xfrm rot="20530362">
+            <a:off x="5187293" y="1193179"/>
+            <a:ext cx="71795" cy="979696"/>
+            <a:chOff x="4991321" y="1224855"/>
+            <a:chExt cx="45719" cy="852211"/>
+          </a:xfrm>
+        </p:grpSpPr>
+        <p:sp>
+          <p:nvSpPr>
+            <p:cNvPr id="14" name="Isosceles Triangle 13">
+              <a:extLst>
+                <a:ext uri="{FF2B5EF4-FFF2-40B4-BE49-F238E27FC236}">
+                  <a16:creationId xmlns:a16="http://schemas.microsoft.com/office/drawing/2014/main" id="{DEBCB226-DBB7-4515-A5C3-2693324E28F4}"/>
+                </a:ext>
+              </a:extLst>
+            </p:cNvPr>
+            <p:cNvSpPr/>
+            <p:nvPr/>
+          </p:nvSpPr>
+          <p:spPr>
+            <a:xfrm>
+              <a:off x="4991321" y="1224855"/>
+              <a:ext cx="45719" cy="81710"/>
+            </a:xfrm>
+            <a:prstGeom prst="triangle">
+              <a:avLst/>
+            </a:prstGeom>
+            <a:noFill/>
+            <a:ln>
+              <a:solidFill>
+                <a:schemeClr val="accent1"/>
+              </a:solidFill>
+            </a:ln>
+          </p:spPr>
+          <p:style>
+            <a:lnRef idx="2">
+              <a:schemeClr val="accent1">
+                <a:shade val="50000"/>
+              </a:schemeClr>
+            </a:lnRef>
+            <a:fillRef idx="1">
+              <a:schemeClr val="accent1"/>
+            </a:fillRef>
+            <a:effectRef idx="0">
+              <a:schemeClr val="accent1"/>
+            </a:effectRef>
+            <a:fontRef idx="minor">
+              <a:schemeClr val="lt1"/>
+            </a:fontRef>
+          </p:style>
+          <p:txBody>
+            <a:bodyPr rtlCol="0" anchor="ctr"/>
+            <a:lstStyle/>
+            <a:p>
+              <a:pPr algn="ctr"/>
+              <a:endParaRPr lang="en-CA"/>
+            </a:p>
+          </p:txBody>
+        </p:sp>
+        <p:cxnSp>
+          <p:nvCxnSpPr>
+            <p:cNvPr id="16" name="Straight Connector 15">
+              <a:extLst>
+                <a:ext uri="{FF2B5EF4-FFF2-40B4-BE49-F238E27FC236}">
+                  <a16:creationId xmlns:a16="http://schemas.microsoft.com/office/drawing/2014/main" id="{5BA0E397-95E0-453F-81FD-9234FDA169A2}"/>
+                </a:ext>
+              </a:extLst>
+            </p:cNvPr>
+            <p:cNvCxnSpPr>
+              <a:cxnSpLocks/>
+              <a:stCxn id="14" idx="3"/>
+            </p:cNvCxnSpPr>
+            <p:nvPr/>
+          </p:nvCxnSpPr>
+          <p:spPr>
+            <a:xfrm>
+              <a:off x="5014181" y="1306565"/>
+              <a:ext cx="0" cy="770501"/>
+            </a:xfrm>
+            <a:prstGeom prst="line">
+              <a:avLst/>
+            </a:prstGeom>
+            <a:ln>
+              <a:solidFill>
+                <a:schemeClr val="accent1"/>
+              </a:solidFill>
+            </a:ln>
+          </p:spPr>
+          <p:style>
+            <a:lnRef idx="1">
+              <a:schemeClr val="dk1"/>
+            </a:lnRef>
+            <a:fillRef idx="0">
+              <a:schemeClr val="dk1"/>
+            </a:fillRef>
+            <a:effectRef idx="0">
+              <a:schemeClr val="dk1"/>
+            </a:effectRef>
+            <a:fontRef idx="minor">
+              <a:schemeClr val="tx1"/>
+            </a:fontRef>
+          </p:style>
+        </p:cxnSp>
+      </p:grpSp>
+      <p:grpSp>
+        <p:nvGrpSpPr>
+          <p:cNvPr id="51" name="Group 50">
+            <a:extLst>
+              <a:ext uri="{FF2B5EF4-FFF2-40B4-BE49-F238E27FC236}">
+                <a16:creationId xmlns:a16="http://schemas.microsoft.com/office/drawing/2014/main" id="{D3FD0635-307B-4743-A417-960FD15E0507}"/>
+              </a:ext>
+            </a:extLst>
+          </p:cNvPr>
+          <p:cNvGrpSpPr/>
+          <p:nvPr/>
+        </p:nvGrpSpPr>
+        <p:grpSpPr>
+          <a:xfrm rot="1230283">
+            <a:off x="4686439" y="1188119"/>
+            <a:ext cx="71795" cy="979696"/>
+            <a:chOff x="4991321" y="1224855"/>
+            <a:chExt cx="45719" cy="852211"/>
+          </a:xfrm>
+        </p:grpSpPr>
+        <p:sp>
+          <p:nvSpPr>
+            <p:cNvPr id="52" name="Isosceles Triangle 51">
+              <a:extLst>
+                <a:ext uri="{FF2B5EF4-FFF2-40B4-BE49-F238E27FC236}">
+                  <a16:creationId xmlns:a16="http://schemas.microsoft.com/office/drawing/2014/main" id="{7098AA80-C5C6-4810-BD8F-D6E5147319C8}"/>
+                </a:ext>
+              </a:extLst>
+            </p:cNvPr>
+            <p:cNvSpPr/>
+            <p:nvPr/>
+          </p:nvSpPr>
+          <p:spPr>
+            <a:xfrm>
+              <a:off x="4991321" y="1224855"/>
+              <a:ext cx="45719" cy="81710"/>
+            </a:xfrm>
+            <a:prstGeom prst="triangle">
+              <a:avLst/>
+            </a:prstGeom>
+            <a:noFill/>
+            <a:ln>
+              <a:solidFill>
+                <a:schemeClr val="accent1"/>
+              </a:solidFill>
+            </a:ln>
+          </p:spPr>
+          <p:style>
+            <a:lnRef idx="2">
+              <a:schemeClr val="accent1">
+                <a:shade val="50000"/>
+              </a:schemeClr>
+            </a:lnRef>
+            <a:fillRef idx="1">
+              <a:schemeClr val="accent1"/>
+            </a:fillRef>
+            <a:effectRef idx="0">
+              <a:schemeClr val="accent1"/>
+            </a:effectRef>
+            <a:fontRef idx="minor">
+              <a:schemeClr val="lt1"/>
+            </a:fontRef>
+          </p:style>
+          <p:txBody>
+            <a:bodyPr rtlCol="0" anchor="ctr"/>
+            <a:lstStyle/>
+            <a:p>
+              <a:pPr algn="ctr"/>
+              <a:endParaRPr lang="en-CA"/>
+            </a:p>
+          </p:txBody>
+        </p:sp>
+        <p:cxnSp>
+          <p:nvCxnSpPr>
+            <p:cNvPr id="53" name="Straight Connector 52">
+              <a:extLst>
+                <a:ext uri="{FF2B5EF4-FFF2-40B4-BE49-F238E27FC236}">
+                  <a16:creationId xmlns:a16="http://schemas.microsoft.com/office/drawing/2014/main" id="{63DB8FD1-E01B-4F13-AE2A-28C951B7CE39}"/>
+                </a:ext>
+              </a:extLst>
+            </p:cNvPr>
+            <p:cNvCxnSpPr>
+              <a:cxnSpLocks/>
+              <a:stCxn id="52" idx="3"/>
+            </p:cNvCxnSpPr>
+            <p:nvPr/>
+          </p:nvCxnSpPr>
+          <p:spPr>
+            <a:xfrm>
+              <a:off x="5014181" y="1306565"/>
+              <a:ext cx="0" cy="770501"/>
+            </a:xfrm>
+            <a:prstGeom prst="line">
+              <a:avLst/>
+            </a:prstGeom>
+            <a:ln>
+              <a:solidFill>
+                <a:schemeClr val="accent1"/>
+              </a:solidFill>
+            </a:ln>
+          </p:spPr>
+          <p:style>
+            <a:lnRef idx="1">
+              <a:schemeClr val="dk1"/>
+            </a:lnRef>
+            <a:fillRef idx="0">
+              <a:schemeClr val="dk1"/>
+            </a:fillRef>
+            <a:effectRef idx="0">
+              <a:schemeClr val="dk1"/>
+            </a:effectRef>
+            <a:fontRef idx="minor">
+              <a:schemeClr val="tx1"/>
+            </a:fontRef>
+          </p:style>
+        </p:cxnSp>
+      </p:grpSp>
     </p:spTree>
     <p:extLst>
       <p:ext uri="{BB962C8B-B14F-4D97-AF65-F5344CB8AC3E}">

</xml_diff>